<commit_message>
Styling of requirement documents are updated
</commit_message>
<xml_diff>
--- a/Requirements/Online Car Rental System Requirements.pptx
+++ b/Requirements/Online Car Rental System Requirements.pptx
@@ -852,7 +852,7 @@
           <a:p>
             <a:fld id="{6257FD47-D522-4DE7-B0B8-36846D1240F8}" type="datetimeFigureOut">
               <a:rPr lang="en-US" smtClean="0"/>
-              <a:t>02-Mar-20</a:t>
+              <a:t>06-Jun-20</a:t>
             </a:fld>
             <a:endParaRPr lang="en-US"/>
           </a:p>
@@ -1103,7 +1103,7 @@
           <a:p>
             <a:fld id="{6257FD47-D522-4DE7-B0B8-36846D1240F8}" type="datetimeFigureOut">
               <a:rPr lang="en-US" smtClean="0"/>
-              <a:t>02-Mar-20</a:t>
+              <a:t>06-Jun-20</a:t>
             </a:fld>
             <a:endParaRPr lang="en-US"/>
           </a:p>
@@ -1417,7 +1417,7 @@
           <a:p>
             <a:fld id="{6257FD47-D522-4DE7-B0B8-36846D1240F8}" type="datetimeFigureOut">
               <a:rPr lang="en-US" smtClean="0"/>
-              <a:t>02-Mar-20</a:t>
+              <a:t>06-Jun-20</a:t>
             </a:fld>
             <a:endParaRPr lang="en-US"/>
           </a:p>
@@ -1758,7 +1758,7 @@
           <a:p>
             <a:fld id="{6257FD47-D522-4DE7-B0B8-36846D1240F8}" type="datetimeFigureOut">
               <a:rPr lang="en-US" smtClean="0"/>
-              <a:t>02-Mar-20</a:t>
+              <a:t>06-Jun-20</a:t>
             </a:fld>
             <a:endParaRPr lang="en-US"/>
           </a:p>
@@ -2072,7 +2072,7 @@
           <a:p>
             <a:fld id="{6257FD47-D522-4DE7-B0B8-36846D1240F8}" type="datetimeFigureOut">
               <a:rPr lang="en-US" smtClean="0"/>
-              <a:t>02-Mar-20</a:t>
+              <a:t>06-Jun-20</a:t>
             </a:fld>
             <a:endParaRPr lang="en-US"/>
           </a:p>
@@ -2465,7 +2465,7 @@
           <a:p>
             <a:fld id="{6257FD47-D522-4DE7-B0B8-36846D1240F8}" type="datetimeFigureOut">
               <a:rPr lang="en-US" smtClean="0"/>
-              <a:t>02-Mar-20</a:t>
+              <a:t>06-Jun-20</a:t>
             </a:fld>
             <a:endParaRPr lang="en-US"/>
           </a:p>
@@ -2635,7 +2635,7 @@
           <a:p>
             <a:fld id="{6257FD47-D522-4DE7-B0B8-36846D1240F8}" type="datetimeFigureOut">
               <a:rPr lang="en-US" smtClean="0"/>
-              <a:t>02-Mar-20</a:t>
+              <a:t>06-Jun-20</a:t>
             </a:fld>
             <a:endParaRPr lang="en-US"/>
           </a:p>
@@ -2815,7 +2815,7 @@
           <a:p>
             <a:fld id="{6257FD47-D522-4DE7-B0B8-36846D1240F8}" type="datetimeFigureOut">
               <a:rPr lang="en-US" smtClean="0"/>
-              <a:t>02-Mar-20</a:t>
+              <a:t>06-Jun-20</a:t>
             </a:fld>
             <a:endParaRPr lang="en-US"/>
           </a:p>
@@ -2991,7 +2991,7 @@
           <a:p>
             <a:fld id="{6257FD47-D522-4DE7-B0B8-36846D1240F8}" type="datetimeFigureOut">
               <a:rPr lang="en-US" smtClean="0"/>
-              <a:t>02-Mar-20</a:t>
+              <a:t>06-Jun-20</a:t>
             </a:fld>
             <a:endParaRPr lang="en-US"/>
           </a:p>
@@ -3238,7 +3238,7 @@
           <a:p>
             <a:fld id="{6257FD47-D522-4DE7-B0B8-36846D1240F8}" type="datetimeFigureOut">
               <a:rPr lang="en-US" smtClean="0"/>
-              <a:t>02-Mar-20</a:t>
+              <a:t>06-Jun-20</a:t>
             </a:fld>
             <a:endParaRPr lang="en-US"/>
           </a:p>
@@ -3470,7 +3470,7 @@
           <a:p>
             <a:fld id="{6257FD47-D522-4DE7-B0B8-36846D1240F8}" type="datetimeFigureOut">
               <a:rPr lang="en-US" smtClean="0"/>
-              <a:t>02-Mar-20</a:t>
+              <a:t>06-Jun-20</a:t>
             </a:fld>
             <a:endParaRPr lang="en-US"/>
           </a:p>
@@ -3844,7 +3844,7 @@
           <a:p>
             <a:fld id="{6257FD47-D522-4DE7-B0B8-36846D1240F8}" type="datetimeFigureOut">
               <a:rPr lang="en-US" smtClean="0"/>
-              <a:t>02-Mar-20</a:t>
+              <a:t>06-Jun-20</a:t>
             </a:fld>
             <a:endParaRPr lang="en-US"/>
           </a:p>
@@ -3967,7 +3967,7 @@
           <a:p>
             <a:fld id="{6257FD47-D522-4DE7-B0B8-36846D1240F8}" type="datetimeFigureOut">
               <a:rPr lang="en-US" smtClean="0"/>
-              <a:t>02-Mar-20</a:t>
+              <a:t>06-Jun-20</a:t>
             </a:fld>
             <a:endParaRPr lang="en-US"/>
           </a:p>
@@ -4062,7 +4062,7 @@
           <a:p>
             <a:fld id="{6257FD47-D522-4DE7-B0B8-36846D1240F8}" type="datetimeFigureOut">
               <a:rPr lang="en-US" smtClean="0"/>
-              <a:t>02-Mar-20</a:t>
+              <a:t>06-Jun-20</a:t>
             </a:fld>
             <a:endParaRPr lang="en-US"/>
           </a:p>
@@ -4317,7 +4317,7 @@
           <a:p>
             <a:fld id="{6257FD47-D522-4DE7-B0B8-36846D1240F8}" type="datetimeFigureOut">
               <a:rPr lang="en-US" smtClean="0"/>
-              <a:t>02-Mar-20</a:t>
+              <a:t>06-Jun-20</a:t>
             </a:fld>
             <a:endParaRPr lang="en-US"/>
           </a:p>
@@ -4580,7 +4580,7 @@
           <a:p>
             <a:fld id="{6257FD47-D522-4DE7-B0B8-36846D1240F8}" type="datetimeFigureOut">
               <a:rPr lang="en-US" smtClean="0"/>
-              <a:t>02-Mar-20</a:t>
+              <a:t>06-Jun-20</a:t>
             </a:fld>
             <a:endParaRPr lang="en-US"/>
           </a:p>
@@ -5323,7 +5323,7 @@
           <a:p>
             <a:fld id="{6257FD47-D522-4DE7-B0B8-36846D1240F8}" type="datetimeFigureOut">
               <a:rPr lang="en-US" smtClean="0"/>
-              <a:t>02-Mar-20</a:t>
+              <a:t>06-Jun-20</a:t>
             </a:fld>
             <a:endParaRPr lang="en-US"/>
           </a:p>
@@ -6491,33 +6491,6 @@
             </a:r>
           </a:p>
           <a:p>
-            <a:pPr lvl="1"/>
-            <a:r>
-              <a:rPr lang="en-US" sz="1400" b="1" dirty="0">
-                <a:solidFill>
-                  <a:schemeClr val="accent6">
-                    <a:lumMod val="50000"/>
-                  </a:schemeClr>
-                </a:solidFill>
-              </a:rPr>
-              <a:t>Session  Requirements</a:t>
-            </a:r>
-            <a:endParaRPr lang="tr-TR" sz="1400" b="1" dirty="0">
-              <a:solidFill>
-                <a:schemeClr val="accent6">
-                  <a:lumMod val="50000"/>
-                </a:schemeClr>
-              </a:solidFill>
-            </a:endParaRPr>
-          </a:p>
-          <a:p>
-            <a:pPr lvl="2" fontAlgn="base"/>
-            <a:r>
-              <a:rPr lang="en-US" sz="1200" dirty="0"/>
-              <a:t>If a user had not chosen to keep their session alive during login, the session shall be expired by the system when the browser tab is closed or when it had been alive and idle for an hour.</a:t>
-            </a:r>
-          </a:p>
-          <a:p>
             <a:pPr lvl="1" fontAlgn="base"/>
             <a:r>
               <a:rPr lang="en-US" sz="1400" b="1" dirty="0"/>
@@ -6733,53 +6706,52 @@
             </a:r>
           </a:p>
           <a:p>
-            <a:pPr lvl="2" fontAlgn="base"/>
-            <a:r>
-              <a:rPr lang="en-US" sz="1200" dirty="0"/>
+            <a:pPr lvl="2"/>
+            <a:r>
+              <a:rPr lang="en-US" dirty="0"/>
               <a:t>Rental price based on the selected criteria shall be calculated.</a:t>
             </a:r>
-          </a:p>
-          <a:p>
-            <a:pPr lvl="2" fontAlgn="base"/>
-            <a:r>
-              <a:rPr lang="en-US" sz="1200" dirty="0"/>
+            <a:endParaRPr lang="en-US" b="1" i="1" dirty="0"/>
+          </a:p>
+          <a:p>
+            <a:pPr lvl="2"/>
+            <a:r>
+              <a:rPr lang="en-US" dirty="0"/>
               <a:t>User’s criminal record shall be checked based on the info on her/his driver’s license.</a:t>
             </a:r>
-          </a:p>
-          <a:p>
-            <a:pPr lvl="2" fontAlgn="base"/>
-            <a:r>
-              <a:rPr lang="en-US" sz="1200" dirty="0"/>
+            <a:endParaRPr lang="en-US" b="1" i="1" dirty="0"/>
+          </a:p>
+          <a:p>
+            <a:pPr lvl="2"/>
+            <a:r>
+              <a:rPr lang="en-US" dirty="0"/>
               <a:t>If the user is not eligible to reserve a car due to her/his criminal record, a notification shall be shown to the user regarding her/his eligibility.</a:t>
             </a:r>
-          </a:p>
-          <a:p>
-            <a:pPr lvl="2" fontAlgn="base"/>
-            <a:r>
-              <a:rPr lang="en-US" sz="1200" dirty="0"/>
+            <a:endParaRPr lang="en-US" b="1" i="1" dirty="0"/>
+          </a:p>
+          <a:p>
+            <a:pPr lvl="2"/>
+            <a:r>
+              <a:rPr lang="en-US" dirty="0"/>
               <a:t>Final rental price based on the selected criteria shall be shown to the user for approval.</a:t>
             </a:r>
-          </a:p>
-          <a:p>
-            <a:pPr lvl="2" fontAlgn="base"/>
-            <a:r>
-              <a:rPr lang="en-US" sz="1200" dirty="0"/>
+            <a:endParaRPr lang="en-US" b="1" i="1" dirty="0"/>
+          </a:p>
+          <a:p>
+            <a:pPr lvl="2"/>
+            <a:r>
+              <a:rPr lang="en-US" dirty="0"/>
               <a:t>A notification saying that “the paid amount will not be refunded due to late cancellation” shall be shown to the member if s/he tries to make a late cancellation for her/his reservation. </a:t>
             </a:r>
-          </a:p>
-          <a:p>
-            <a:pPr lvl="2" fontAlgn="base"/>
-            <a:r>
-              <a:rPr lang="en-US" sz="1200" dirty="0"/>
+            <a:endParaRPr lang="en-US" b="1" i="1" dirty="0"/>
+          </a:p>
+          <a:p>
+            <a:pPr lvl="2"/>
+            <a:r>
+              <a:rPr lang="en-US" dirty="0"/>
               <a:t>If the user requests an extension for her/his car rental date, the system shall check the database for the availability of the car.</a:t>
             </a:r>
-          </a:p>
-          <a:p>
-            <a:pPr lvl="2" fontAlgn="base"/>
-            <a:r>
-              <a:rPr lang="en-US" sz="1200" dirty="0"/>
-              <a:t>If a search result is already in the reservation process for another user, the system shall notify the user that the suggested vehicle is no longer available for reservation.</a:t>
-            </a:r>
+            <a:endParaRPr lang="en-US" b="1" i="1" dirty="0"/>
           </a:p>
           <a:p>
             <a:pPr lvl="1"/>
@@ -7121,84 +7093,84 @@
             </a:endParaRPr>
           </a:p>
           <a:p>
-            <a:pPr lvl="2" fontAlgn="base"/>
+            <a:pPr lvl="2"/>
             <a:r>
               <a:rPr lang="en-US" dirty="0"/>
               <a:t>The system shall not allow the users, who do not have a verified e-mail address, to make a reservation.</a:t>
             </a:r>
-            <a:endParaRPr lang="en-US" sz="1600" dirty="0"/>
-          </a:p>
-          <a:p>
-            <a:pPr lvl="2" fontAlgn="base"/>
+            <a:endParaRPr lang="en-US" b="1" i="1" dirty="0"/>
+          </a:p>
+          <a:p>
+            <a:pPr lvl="2"/>
             <a:r>
               <a:rPr lang="en-US" dirty="0"/>
               <a:t>The system shall not allow the users, who do not have a verified phone number, to make a reservation.</a:t>
             </a:r>
-            <a:endParaRPr lang="en-US" sz="1600" dirty="0"/>
-          </a:p>
-          <a:p>
-            <a:pPr lvl="2" fontAlgn="base"/>
+            <a:endParaRPr lang="en-US" b="1" i="1" dirty="0"/>
+          </a:p>
+          <a:p>
+            <a:pPr lvl="2"/>
             <a:r>
               <a:rPr lang="en-US" dirty="0"/>
               <a:t>The system shall make a rental car unavailable on the website for the dates it is rented out by a member.</a:t>
             </a:r>
-            <a:endParaRPr lang="en-US" sz="1600" dirty="0"/>
-          </a:p>
-          <a:p>
-            <a:pPr lvl="2" fontAlgn="base"/>
+            <a:endParaRPr lang="en-US" b="1" i="1" dirty="0"/>
+          </a:p>
+          <a:p>
+            <a:pPr lvl="2"/>
             <a:r>
               <a:rPr lang="en-US" dirty="0"/>
               <a:t>The system shall make a rental car available on the website when it is returned by the member.</a:t>
             </a:r>
-            <a:endParaRPr lang="en-US" sz="1600" dirty="0"/>
-          </a:p>
-          <a:p>
-            <a:pPr lvl="2" fontAlgn="base"/>
+            <a:endParaRPr lang="en-US" b="1" i="1" dirty="0"/>
+          </a:p>
+          <a:p>
+            <a:pPr lvl="2"/>
             <a:r>
               <a:rPr lang="en-US" dirty="0"/>
               <a:t>The system shall ensure a rental car is at the rental start location by the rental start date.</a:t>
             </a:r>
-            <a:endParaRPr lang="en-US" sz="1600" dirty="0"/>
-          </a:p>
-          <a:p>
-            <a:pPr lvl="2" fontAlgn="base"/>
+            <a:endParaRPr lang="en-US" b="1" i="1" dirty="0"/>
+          </a:p>
+          <a:p>
+            <a:pPr lvl="2"/>
             <a:r>
               <a:rPr lang="en-US" dirty="0"/>
               <a:t>In case a rental car becomes unavailable based on its incident report, the system shall put all reservation options on it indefinitely on hold.</a:t>
             </a:r>
-            <a:endParaRPr lang="en-US" sz="1600" dirty="0"/>
-          </a:p>
-          <a:p>
-            <a:pPr lvl="2" fontAlgn="base"/>
+            <a:endParaRPr lang="en-US" b="1" i="1" dirty="0"/>
+          </a:p>
+          <a:p>
+            <a:pPr lvl="2"/>
             <a:r>
               <a:rPr lang="en-US" dirty="0"/>
               <a:t>In case a rental car becomes unavailable based on its incident report but the car already had been reserved for dates it is now unavailable for, the system shall upgrade the car choice for the members who had reserved it prior to the incident, and notify the members accordingly.</a:t>
             </a:r>
-            <a:endParaRPr lang="en-US" sz="1600" dirty="0"/>
-          </a:p>
-          <a:p>
-            <a:pPr lvl="2" fontAlgn="base"/>
+            <a:endParaRPr lang="en-US" b="1" i="1" dirty="0"/>
+          </a:p>
+          <a:p>
+            <a:pPr lvl="2"/>
             <a:r>
               <a:rPr lang="en-US" dirty="0"/>
               <a:t>The system shall notify a member of an upcoming rental via their chosen method of notification, stating the rental start date, car pick-up location, rental end date and return location.</a:t>
             </a:r>
-            <a:endParaRPr lang="en-US" sz="1600" dirty="0"/>
-          </a:p>
-          <a:p>
-            <a:pPr lvl="2" fontAlgn="base"/>
+            <a:endParaRPr lang="en-US" b="1" i="1" dirty="0"/>
+          </a:p>
+          <a:p>
+            <a:pPr lvl="2"/>
             <a:r>
               <a:rPr lang="en-US" dirty="0"/>
-              <a:t>In case of a traffic ticket received on plate number during a user’s rental period, the system shall withdraw the required amount by using user’s bank card info.</a:t>
-            </a:r>
-            <a:endParaRPr lang="en-US" sz="1600" dirty="0"/>
-          </a:p>
-          <a:p>
-            <a:pPr lvl="2" fontAlgn="base"/>
+              <a:t>In case of a traffic ticket received for a rental car during a user’s rental period, the system shall withdraw the required amount by using user’s bank card info.</a:t>
+            </a:r>
+            <a:endParaRPr lang="en-US" b="1" i="1" dirty="0"/>
+          </a:p>
+          <a:p>
+            <a:pPr lvl="2"/>
             <a:r>
               <a:rPr lang="en-US" dirty="0"/>
               <a:t>The system shall notify the user with her/his preferred way of communication method if a traffic ticket received during the rental period of that user with mentioning the ticket amount received.</a:t>
             </a:r>
-            <a:endParaRPr lang="en-US" sz="1600" dirty="0"/>
+            <a:endParaRPr lang="en-US" b="1" i="1" dirty="0"/>
           </a:p>
           <a:p>
             <a:pPr lvl="1"/>
@@ -7337,33 +7309,6 @@
                 </a:solidFill>
               </a:rPr>
               <a:t>Requirements</a:t>
-            </a:r>
-          </a:p>
-          <a:p>
-            <a:pPr lvl="1"/>
-            <a:r>
-              <a:rPr lang="en-US" sz="1400" b="1" dirty="0">
-                <a:solidFill>
-                  <a:schemeClr val="accent6">
-                    <a:lumMod val="50000"/>
-                  </a:schemeClr>
-                </a:solidFill>
-              </a:rPr>
-              <a:t>Promotion Requirements</a:t>
-            </a:r>
-          </a:p>
-          <a:p>
-            <a:pPr lvl="2" fontAlgn="base"/>
-            <a:r>
-              <a:rPr lang="en-US" sz="1200" dirty="0"/>
-              <a:t>The system shall randomly provide promotion options to its members on the website when a rental car with a higher price per day is available at the same location for the rental duration.</a:t>
-            </a:r>
-          </a:p>
-          <a:p>
-            <a:pPr lvl="2" fontAlgn="base"/>
-            <a:r>
-              <a:rPr lang="en-US" sz="1200" dirty="0"/>
-              <a:t>The system shall notify the members about a promotion option via their chosen method of notification.</a:t>
             </a:r>
           </a:p>
           <a:p>
@@ -10073,158 +10018,90 @@
           <a:p>
             <a:pPr lvl="2"/>
             <a:r>
-              <a:rPr lang="en-US" dirty="0">
-                <a:solidFill>
-                  <a:schemeClr val="accent6">
-                    <a:lumMod val="50000"/>
-                  </a:schemeClr>
-                </a:solidFill>
-              </a:rPr>
+              <a:rPr lang="en-US" dirty="0"/>
               <a:t>A guest user shall be able to register to the system with a driver’s license, a bank card number, a phone number, an e-mail address and a valid password to become a member.</a:t>
             </a:r>
+            <a:endParaRPr lang="en-US" b="1" i="1" dirty="0"/>
           </a:p>
           <a:p>
             <a:pPr lvl="2"/>
             <a:r>
-              <a:rPr lang="en-US" dirty="0">
-                <a:solidFill>
-                  <a:schemeClr val="accent6">
-                    <a:lumMod val="50000"/>
-                  </a:schemeClr>
-                </a:solidFill>
-              </a:rPr>
-              <a:t>An admin shall be able to create, update and delete employee accounts.</a:t>
-            </a:r>
+              <a:rPr lang="en-US" dirty="0"/>
+              <a:t>An admin shall be able to create employee accounts with employee social security number, first name, last name and office location.</a:t>
+            </a:r>
+            <a:endParaRPr lang="en-US" b="1" i="1" dirty="0"/>
           </a:p>
           <a:p>
             <a:pPr lvl="2"/>
             <a:r>
-              <a:rPr lang="en-US" dirty="0">
-                <a:solidFill>
-                  <a:schemeClr val="accent6">
-                    <a:lumMod val="50000"/>
-                  </a:schemeClr>
-                </a:solidFill>
-              </a:rPr>
+              <a:rPr lang="en-US" dirty="0"/>
+              <a:t>An admin shall be able to update an employee account’s office location.</a:t>
+            </a:r>
+            <a:endParaRPr lang="en-US" b="1" i="1" dirty="0"/>
+          </a:p>
+          <a:p>
+            <a:pPr lvl="2"/>
+            <a:r>
+              <a:rPr lang="en-US" dirty="0"/>
+              <a:t>An admin shall be able to delete employee accounts.</a:t>
+            </a:r>
+            <a:endParaRPr lang="en-US" b="1" i="1" dirty="0"/>
+          </a:p>
+          <a:p>
+            <a:pPr lvl="2"/>
+            <a:r>
+              <a:rPr lang="en-US" dirty="0"/>
               <a:t>A member, an employee and an admin shall be able to log in to the system with an e-mail address and password.</a:t>
             </a:r>
+            <a:endParaRPr lang="en-US" b="1" i="1" dirty="0"/>
           </a:p>
           <a:p>
             <a:pPr lvl="2"/>
             <a:r>
-              <a:rPr lang="en-US" dirty="0">
-                <a:solidFill>
-                  <a:schemeClr val="accent6">
-                    <a:lumMod val="50000"/>
-                  </a:schemeClr>
-                </a:solidFill>
-              </a:rPr>
+              <a:rPr lang="en-US" dirty="0"/>
               <a:t>A member shall verify their e-mail address using the verification code sent to their e-mail address.</a:t>
             </a:r>
+            <a:endParaRPr lang="en-US" b="1" i="1" dirty="0"/>
           </a:p>
           <a:p>
             <a:pPr lvl="2"/>
             <a:r>
-              <a:rPr lang="en-US" dirty="0">
-                <a:solidFill>
-                  <a:schemeClr val="accent6">
-                    <a:lumMod val="50000"/>
-                  </a:schemeClr>
-                </a:solidFill>
-              </a:rPr>
+              <a:rPr lang="en-US" dirty="0"/>
               <a:t>A member shall verify their phone number using the verification code that sent to their phone number.</a:t>
             </a:r>
+            <a:endParaRPr lang="en-US" b="1" i="1" dirty="0"/>
           </a:p>
           <a:p>
             <a:pPr lvl="2"/>
             <a:r>
-              <a:rPr lang="en-US" dirty="0">
-                <a:solidFill>
-                  <a:schemeClr val="accent6">
-                    <a:lumMod val="50000"/>
-                  </a:schemeClr>
-                </a:solidFill>
-              </a:rPr>
+              <a:rPr lang="en-US" dirty="0"/>
               <a:t>A member, an employee and an admin shall be able to change their password using their e-mail address and current password.</a:t>
             </a:r>
+            <a:endParaRPr lang="en-US" b="1" i="1" dirty="0"/>
           </a:p>
           <a:p>
             <a:pPr lvl="2"/>
             <a:r>
-              <a:rPr lang="en-US" dirty="0">
-                <a:solidFill>
-                  <a:schemeClr val="accent6">
-                    <a:lumMod val="50000"/>
-                  </a:schemeClr>
-                </a:solidFill>
-              </a:rPr>
+              <a:rPr lang="en-US" dirty="0"/>
               <a:t>A member, an employee and an admin shall be able to change their password via a link sent to their e-mail by the system if they forget their password.</a:t>
             </a:r>
+            <a:endParaRPr lang="en-US" b="1" i="1" dirty="0"/>
           </a:p>
           <a:p>
             <a:pPr lvl="2"/>
             <a:r>
-              <a:rPr lang="en-US" dirty="0">
-                <a:solidFill>
-                  <a:schemeClr val="accent6">
-                    <a:lumMod val="50000"/>
-                  </a:schemeClr>
-                </a:solidFill>
-              </a:rPr>
+              <a:rPr lang="en-US" dirty="0"/>
               <a:t>A member shall be able to activate/deactivate her/his membership.</a:t>
             </a:r>
+            <a:endParaRPr lang="en-US" b="1" i="1" dirty="0"/>
           </a:p>
           <a:p>
             <a:pPr lvl="2"/>
             <a:r>
-              <a:rPr lang="en-US" dirty="0">
-                <a:solidFill>
-                  <a:schemeClr val="accent6">
-                    <a:lumMod val="50000"/>
-                  </a:schemeClr>
-                </a:solidFill>
-              </a:rPr>
-              <a:t>An employee shall be able to request a privilege from the admin such as temporary admin rights.</a:t>
-            </a:r>
-          </a:p>
-          <a:p>
-            <a:pPr lvl="2"/>
-            <a:r>
-              <a:rPr lang="en-US" dirty="0">
-                <a:solidFill>
-                  <a:schemeClr val="accent6">
-                    <a:lumMod val="50000"/>
-                  </a:schemeClr>
-                </a:solidFill>
-              </a:rPr>
-              <a:t>An admin shall be able to approve/disapprove an employee’s privilege request.</a:t>
-            </a:r>
-          </a:p>
-          <a:p>
-            <a:pPr lvl="2"/>
-            <a:r>
-              <a:rPr lang="en-US" dirty="0">
-                <a:solidFill>
-                  <a:schemeClr val="accent6">
-                    <a:lumMod val="50000"/>
-                  </a:schemeClr>
-                </a:solidFill>
-              </a:rPr>
-              <a:t>An admin shall be able to update an employee’s privileges.</a:t>
-            </a:r>
-          </a:p>
-          <a:p>
-            <a:pPr lvl="2"/>
-            <a:r>
-              <a:rPr lang="en-US" dirty="0">
-                <a:solidFill>
-                  <a:schemeClr val="accent6">
-                    <a:lumMod val="50000"/>
-                  </a:schemeClr>
-                </a:solidFill>
-              </a:rPr>
+              <a:rPr lang="en-US" dirty="0"/>
               <a:t>A member, an employee and an admin shall be able to log out of the system safely.</a:t>
             </a:r>
+            <a:endParaRPr lang="en-US" b="1" i="1" dirty="0"/>
           </a:p>
           <a:p>
             <a:pPr lvl="2"/>
@@ -10320,7 +10197,7 @@
         </p:spPr>
         <p:txBody>
           <a:bodyPr>
-            <a:normAutofit/>
+            <a:normAutofit fontScale="92500" lnSpcReduction="10000"/>
           </a:bodyPr>
           <a:lstStyle/>
           <a:p>
@@ -10361,127 +10238,103 @@
           <a:p>
             <a:pPr lvl="2"/>
             <a:r>
-              <a:rPr lang="en-US" sz="1200" dirty="0">
+              <a:rPr lang="en-US" dirty="0"/>
+              <a:t>Admin shall be able to add new cars to the database with information about plate number, model, segment, price per day, fuel type, and transmission type.</a:t>
+            </a:r>
+            <a:endParaRPr lang="en-US" b="1" i="1" dirty="0"/>
+          </a:p>
+          <a:p>
+            <a:pPr lvl="2"/>
+            <a:r>
+              <a:rPr lang="en-US" dirty="0"/>
+              <a:t>Admin shall be able to remove cars from the database. </a:t>
+            </a:r>
+            <a:endParaRPr lang="en-US" b="1" i="1" dirty="0"/>
+          </a:p>
+          <a:p>
+            <a:pPr lvl="2"/>
+            <a:r>
+              <a:rPr lang="en-US" dirty="0"/>
+              <a:t>Admin shall be able to list all the rental cars in the fleet.</a:t>
+            </a:r>
+            <a:endParaRPr lang="en-US" b="1" i="1" dirty="0"/>
+          </a:p>
+          <a:p>
+            <a:pPr lvl="2"/>
+            <a:r>
+              <a:rPr lang="en-US" dirty="0"/>
+              <a:t>Admin shall be able to list all the employees.</a:t>
+            </a:r>
+            <a:endParaRPr lang="en-US" b="1" i="1" dirty="0"/>
+          </a:p>
+          <a:p>
+            <a:pPr lvl="2"/>
+            <a:r>
+              <a:rPr lang="en-US" dirty="0"/>
+              <a:t>Admin shall be able to update price per day for a rental car in the database.</a:t>
+            </a:r>
+            <a:endParaRPr lang="en-US" b="1" i="1" dirty="0"/>
+          </a:p>
+          <a:p>
+            <a:pPr lvl="1"/>
+            <a:r>
+              <a:rPr lang="en-US" sz="1400" b="1" dirty="0"/>
+              <a:t>Employee</a:t>
+            </a:r>
+            <a:r>
+              <a:rPr lang="en-US" sz="1400" dirty="0"/>
+              <a:t> </a:t>
+            </a:r>
+            <a:r>
+              <a:rPr lang="en-US" sz="1400" b="1" dirty="0">
                 <a:solidFill>
                   <a:schemeClr val="accent6">
                     <a:lumMod val="50000"/>
                   </a:schemeClr>
                 </a:solidFill>
               </a:rPr>
-              <a:t>Admin shall be able to add new cars to the database.</a:t>
+              <a:t>Requirements</a:t>
             </a:r>
           </a:p>
           <a:p>
             <a:pPr lvl="2"/>
             <a:r>
-              <a:rPr lang="en-US" sz="1200" dirty="0">
-                <a:solidFill>
-                  <a:schemeClr val="accent6">
-                    <a:lumMod val="50000"/>
-                  </a:schemeClr>
-                </a:solidFill>
-              </a:rPr>
-              <a:t>Admin shall be able to remove cars from the database.</a:t>
-            </a:r>
+              <a:rPr lang="en-US" dirty="0"/>
+              <a:t>An employee shall be able to register a new user with a driver’s license, a credit card number, a phone number, an e-mail address and a valid password.</a:t>
+            </a:r>
+            <a:endParaRPr lang="en-US" b="1" i="1" dirty="0"/>
           </a:p>
           <a:p>
             <a:pPr lvl="2"/>
             <a:r>
-              <a:rPr lang="en-US" sz="1200" dirty="0">
-                <a:solidFill>
-                  <a:schemeClr val="accent6">
-                    <a:lumMod val="50000"/>
-                  </a:schemeClr>
-                </a:solidFill>
-              </a:rPr>
-              <a:t>Admin shall be able to update car information such as price in the database.</a:t>
-            </a:r>
+              <a:rPr lang="en-US" dirty="0"/>
+              <a:t>An employee shall be able to create a reservation for a member.</a:t>
+            </a:r>
+            <a:endParaRPr lang="en-US" b="1" i="1" dirty="0"/>
           </a:p>
           <a:p>
             <a:pPr lvl="2"/>
             <a:r>
-              <a:rPr lang="en-US" sz="1200" dirty="0">
-                <a:solidFill>
-                  <a:schemeClr val="accent6">
-                    <a:lumMod val="50000"/>
-                  </a:schemeClr>
-                </a:solidFill>
-              </a:rPr>
-              <a:t>Admin shall be able to specify the vehicle’s properties/info in the database.</a:t>
-            </a:r>
-          </a:p>
-          <a:p>
-            <a:pPr lvl="1"/>
-            <a:r>
-              <a:rPr lang="en-US" sz="1400" b="1" dirty="0"/>
-              <a:t>Employee</a:t>
-            </a:r>
-            <a:r>
-              <a:rPr lang="en-US" sz="1400" dirty="0"/>
-              <a:t> </a:t>
-            </a:r>
-            <a:r>
-              <a:rPr lang="en-US" sz="1400" b="1" dirty="0">
-                <a:solidFill>
-                  <a:schemeClr val="accent6">
-                    <a:lumMod val="50000"/>
-                  </a:schemeClr>
-                </a:solidFill>
-              </a:rPr>
-              <a:t>Requirements</a:t>
-            </a:r>
+              <a:rPr lang="en-US" dirty="0"/>
+              <a:t>An employee shall be able to update a member’s reservation duration.</a:t>
+            </a:r>
+            <a:endParaRPr lang="en-US" b="1" i="1" dirty="0"/>
           </a:p>
           <a:p>
             <a:pPr lvl="2"/>
             <a:r>
-              <a:rPr lang="en-US" sz="1200" dirty="0">
-                <a:solidFill>
-                  <a:schemeClr val="accent6">
-                    <a:lumMod val="50000"/>
-                  </a:schemeClr>
-                </a:solidFill>
-              </a:rPr>
-              <a:t>An employee shall be able to register a new user with a driver’s license, a credit card number, a phone number, an e-mail address and a valid password </a:t>
-            </a:r>
+              <a:rPr lang="en-US" dirty="0"/>
+              <a:t>An employee shall be able to cancel a member’s reservation.</a:t>
+            </a:r>
+            <a:endParaRPr lang="en-US" b="1" i="1" dirty="0"/>
           </a:p>
           <a:p>
             <a:pPr lvl="2"/>
             <a:r>
-              <a:rPr lang="en-US" sz="1200" dirty="0">
-                <a:solidFill>
-                  <a:schemeClr val="accent6">
-                    <a:lumMod val="50000"/>
-                  </a:schemeClr>
-                </a:solidFill>
-              </a:rPr>
-              <a:t>An employee shall be able to input/update a member’s booking preferences.</a:t>
-            </a:r>
-          </a:p>
-          <a:p>
-            <a:pPr lvl="2"/>
-            <a:r>
-              <a:rPr lang="en-US" sz="1200" dirty="0">
-                <a:solidFill>
-                  <a:schemeClr val="accent6">
-                    <a:lumMod val="50000"/>
-                  </a:schemeClr>
-                </a:solidFill>
-              </a:rPr>
-              <a:t>An employee shall be able to cancel a member’s booking.</a:t>
-            </a:r>
-          </a:p>
-          <a:p>
-            <a:pPr lvl="2"/>
-            <a:r>
-              <a:rPr lang="en-US" sz="1200" dirty="0">
-                <a:solidFill>
-                  <a:schemeClr val="accent6">
-                    <a:lumMod val="50000"/>
-                  </a:schemeClr>
-                </a:solidFill>
-              </a:rPr>
-              <a:t>An employee shall be able to track the new user’s criminal record background via her/his driver’s license info.</a:t>
-            </a:r>
+              <a:rPr lang="en-US" dirty="0"/>
+              <a:t>An employee shall be able to track a member’s criminal record background via her/his driver’s license info.</a:t>
+            </a:r>
+            <a:endParaRPr lang="en-US" b="1" i="1" dirty="0"/>
           </a:p>
           <a:p>
             <a:pPr lvl="2"/>
@@ -10605,14 +10458,6 @@
           <a:p>
             <a:pPr lvl="1"/>
             <a:r>
-              <a:rPr lang="en-US" sz="1400" b="1" dirty="0"/>
-              <a:t>Session</a:t>
-            </a:r>
-            <a:r>
-              <a:rPr lang="en-US" sz="1400" dirty="0"/>
-              <a:t> </a:t>
-            </a:r>
-            <a:r>
               <a:rPr lang="en-US" sz="1400" b="1" dirty="0">
                 <a:solidFill>
                   <a:schemeClr val="accent6">
@@ -10620,31 +10465,18 @@
                   </a:schemeClr>
                 </a:solidFill>
               </a:rPr>
-              <a:t>Requirements</a:t>
-            </a:r>
-          </a:p>
-          <a:p>
-            <a:pPr lvl="2"/>
-            <a:r>
-              <a:rPr lang="en-US" sz="1200" dirty="0">
+              <a:t>Recommendation</a:t>
+            </a:r>
+            <a:r>
+              <a:rPr lang="tr-TR" sz="1400" b="1" dirty="0">
                 <a:solidFill>
                   <a:schemeClr val="accent6">
                     <a:lumMod val="50000"/>
                   </a:schemeClr>
                 </a:solidFill>
               </a:rPr>
-              <a:t>During a log in, a member shall be able to choose whether they want to keep their session active indefinitely.</a:t>
-            </a:r>
-            <a:endParaRPr lang="tr-TR" sz="1200" dirty="0">
-              <a:solidFill>
-                <a:schemeClr val="accent6">
-                  <a:lumMod val="50000"/>
-                </a:schemeClr>
-              </a:solidFill>
-            </a:endParaRPr>
-          </a:p>
-          <a:p>
-            <a:pPr lvl="1"/>
+              <a:t> </a:t>
+            </a:r>
             <a:r>
               <a:rPr lang="en-US" sz="1400" b="1" dirty="0">
                 <a:solidFill>
@@ -10653,44 +10485,24 @@
                   </a:schemeClr>
                 </a:solidFill>
               </a:rPr>
-              <a:t>Recommendation</a:t>
-            </a:r>
-            <a:r>
-              <a:rPr lang="tr-TR" sz="1400" b="1" dirty="0">
-                <a:solidFill>
-                  <a:schemeClr val="accent6">
-                    <a:lumMod val="50000"/>
-                  </a:schemeClr>
-                </a:solidFill>
-              </a:rPr>
-              <a:t> </a:t>
-            </a:r>
-            <a:r>
-              <a:rPr lang="en-US" sz="1400" b="1" dirty="0">
-                <a:solidFill>
-                  <a:schemeClr val="accent6">
-                    <a:lumMod val="50000"/>
-                  </a:schemeClr>
-                </a:solidFill>
-              </a:rPr>
               <a:t>Requirements</a:t>
             </a:r>
           </a:p>
           <a:p>
-            <a:pPr lvl="2" fontAlgn="base"/>
-            <a:r>
-              <a:rPr lang="en-US" sz="1200" dirty="0"/>
+            <a:pPr lvl="2"/>
+            <a:r>
+              <a:rPr lang="en-US" dirty="0"/>
               <a:t>A member shall be able to pick one of the cars recommended by the system and proceed to the next steps of reservation.</a:t>
             </a:r>
-            <a:endParaRPr lang="en-US" dirty="0"/>
-          </a:p>
-          <a:p>
-            <a:pPr lvl="2" fontAlgn="base"/>
-            <a:r>
-              <a:rPr lang="en-US" sz="1200" dirty="0"/>
+            <a:endParaRPr lang="en-US" b="1" i="1" dirty="0"/>
+          </a:p>
+          <a:p>
+            <a:pPr lvl="2"/>
+            <a:r>
+              <a:rPr lang="en-US" dirty="0"/>
               <a:t>A guest user shall be able to pick one of the cars recommended by the system and proceed to the login/membership registration page.</a:t>
             </a:r>
-            <a:endParaRPr lang="en-US" dirty="0"/>
+            <a:endParaRPr lang="en-US" b="1" i="1" dirty="0"/>
           </a:p>
           <a:p>
             <a:pPr lvl="2"/>
@@ -10828,80 +10640,50 @@
           <a:p>
             <a:pPr lvl="2"/>
             <a:r>
-              <a:rPr lang="en-US" sz="1200" dirty="0">
-                <a:solidFill>
-                  <a:schemeClr val="accent6">
-                    <a:lumMod val="50000"/>
-                  </a:schemeClr>
-                </a:solidFill>
-              </a:rPr>
+              <a:rPr lang="en-US" dirty="0"/>
               <a:t>A member, an employee and a guest shall be able to search for a rental car based on rental start date, rental start location, rental end date, rental end location.</a:t>
             </a:r>
+            <a:endParaRPr lang="en-US" b="1" i="1" dirty="0"/>
           </a:p>
           <a:p>
             <a:pPr lvl="2"/>
             <a:r>
-              <a:rPr lang="en-US" sz="1200" dirty="0">
-                <a:solidFill>
-                  <a:schemeClr val="accent6">
-                    <a:lumMod val="50000"/>
-                  </a:schemeClr>
-                </a:solidFill>
-              </a:rPr>
+              <a:rPr lang="en-US" dirty="0"/>
               <a:t>A member, an employee and a guest shall be able to filter their results based on car model, car segment, transmission type (automatic or manual), fuel type (diesel, petrol, electric, hybrid) and price per day.</a:t>
             </a:r>
+            <a:endParaRPr lang="en-US" b="1" i="1" dirty="0"/>
           </a:p>
           <a:p>
             <a:pPr lvl="2"/>
             <a:r>
-              <a:rPr lang="en-US" sz="1200" dirty="0">
-                <a:solidFill>
-                  <a:schemeClr val="accent6">
-                    <a:lumMod val="50000"/>
-                  </a:schemeClr>
-                </a:solidFill>
-              </a:rPr>
+              <a:rPr lang="en-US" dirty="0"/>
               <a:t>A member and an employee shall be able to pick one of the search results as their rental car choice and proceed to the next steps of reservation.</a:t>
             </a:r>
+            <a:endParaRPr lang="en-US" b="1" i="1" dirty="0"/>
           </a:p>
           <a:p>
             <a:pPr lvl="2"/>
             <a:r>
-              <a:rPr lang="en-US" sz="1200" dirty="0">
-                <a:solidFill>
-                  <a:schemeClr val="accent6">
-                    <a:lumMod val="50000"/>
-                  </a:schemeClr>
-                </a:solidFill>
-              </a:rPr>
+              <a:rPr lang="en-US" dirty="0"/>
               <a:t>A guest user shall be able to pick one of the search results provided by the system and proceed to the login/membership registration page.</a:t>
             </a:r>
+            <a:endParaRPr lang="en-US" b="1" i="1" dirty="0"/>
           </a:p>
           <a:p>
             <a:pPr lvl="2"/>
             <a:r>
-              <a:rPr lang="en-US" sz="1200" dirty="0">
-                <a:solidFill>
-                  <a:schemeClr val="accent6">
-                    <a:lumMod val="50000"/>
-                  </a:schemeClr>
-                </a:solidFill>
-              </a:rPr>
-              <a:t>A currently selected search result shall be listed in new search results if it is not reserved within 5 minutes.</a:t>
-            </a:r>
+              <a:rPr lang="en-US" dirty="0"/>
+              <a:t>A currently selected search result by a member shall be listed in new search results for other users as long as the member has not completed reservation.</a:t>
+            </a:r>
+            <a:endParaRPr lang="en-US" b="1" i="1" dirty="0"/>
           </a:p>
           <a:p>
             <a:pPr lvl="2"/>
             <a:r>
-              <a:rPr lang="en-US" sz="1200" dirty="0">
-                <a:solidFill>
-                  <a:schemeClr val="accent6">
-                    <a:lumMod val="50000"/>
-                  </a:schemeClr>
-                </a:solidFill>
-              </a:rPr>
+              <a:rPr lang="en-US" dirty="0"/>
               <a:t>A currently booked rental car shall not be listed in the search results until car returned. </a:t>
             </a:r>
+            <a:endParaRPr lang="en-US" b="1" i="1" dirty="0"/>
           </a:p>
           <a:p>
             <a:pPr lvl="3"/>
@@ -11054,36 +10836,35 @@
             </a:r>
           </a:p>
           <a:p>
-            <a:pPr lvl="2" fontAlgn="base"/>
-            <a:r>
-              <a:rPr lang="en-US" sz="1200" dirty="0"/>
+            <a:pPr lvl="2"/>
+            <a:r>
+              <a:rPr lang="en-US" dirty="0"/>
               <a:t>Insurance and additional driver count selections shall be made by the member before the final price calculation.</a:t>
             </a:r>
-            <a:endParaRPr lang="en-US" dirty="0"/>
-          </a:p>
-          <a:p>
-            <a:pPr lvl="2" fontAlgn="base"/>
-            <a:r>
-              <a:rPr lang="en-US" sz="1200" dirty="0"/>
+            <a:endParaRPr lang="en-US" b="1" i="1" dirty="0"/>
+          </a:p>
+          <a:p>
+            <a:pPr lvl="2"/>
+            <a:r>
+              <a:rPr lang="en-US" dirty="0"/>
               <a:t>Selected criteria and its final rental price shall be approved by the member for reservation.</a:t>
             </a:r>
-            <a:endParaRPr lang="en-US" dirty="0"/>
-          </a:p>
-          <a:p>
-            <a:pPr lvl="2" fontAlgn="base"/>
-            <a:r>
-              <a:rPr lang="en-US" sz="1200" dirty="0"/>
+            <a:endParaRPr lang="en-US" b="1" i="1" dirty="0"/>
+          </a:p>
+          <a:p>
+            <a:pPr lvl="2"/>
+            <a:r>
+              <a:rPr lang="en-US" dirty="0"/>
               <a:t>A member shall be able to cancel her/his reservation not later than 3 days to the pick-up date. </a:t>
             </a:r>
-            <a:endParaRPr lang="en-US" dirty="0"/>
-          </a:p>
-          <a:p>
-            <a:pPr lvl="2" fontAlgn="base"/>
-            <a:r>
-              <a:rPr lang="en-US" sz="1200" dirty="0"/>
-              <a:t>A member shall be able to increase the duration of the rent if the car is not booked by other members.</a:t>
-            </a:r>
-            <a:endParaRPr lang="en-US" dirty="0"/>
+            <a:endParaRPr lang="en-US" b="1" i="1" dirty="0"/>
+          </a:p>
+          <a:p>
+            <a:pPr lvl="2"/>
+            <a:r>
+              <a:rPr lang="en-US" dirty="0"/>
+              <a:t>A member shall be able to change the duration of the rent if the car is not booked by other members.</a:t>
+            </a:r>
           </a:p>
           <a:p>
             <a:pPr lvl="1"/>
@@ -11093,28 +10874,28 @@
             </a:r>
           </a:p>
           <a:p>
-            <a:pPr lvl="2" fontAlgn="base"/>
-            <a:r>
-              <a:rPr lang="en-US" sz="1200" dirty="0"/>
+            <a:pPr lvl="2"/>
+            <a:r>
+              <a:rPr lang="en-US" dirty="0"/>
               <a:t>A member shall make the payment only by using a credit card.</a:t>
             </a:r>
-            <a:endParaRPr lang="en-US" dirty="0"/>
-          </a:p>
-          <a:p>
-            <a:pPr lvl="2" fontAlgn="base"/>
-            <a:r>
-              <a:rPr lang="en-US" sz="1200" dirty="0"/>
+            <a:endParaRPr lang="en-US" b="1" i="1" dirty="0"/>
+          </a:p>
+          <a:p>
+            <a:pPr lvl="2"/>
+            <a:r>
+              <a:rPr lang="en-US" dirty="0"/>
               <a:t>The user shall enter their credit card details to the required credit card info fields.</a:t>
             </a:r>
-            <a:endParaRPr lang="en-US" dirty="0"/>
-          </a:p>
-          <a:p>
-            <a:pPr lvl="2" fontAlgn="base"/>
-            <a:r>
-              <a:rPr lang="en-US" sz="1200" dirty="0"/>
+            <a:endParaRPr lang="en-US" b="1" i="1" dirty="0"/>
+          </a:p>
+          <a:p>
+            <a:pPr lvl="2"/>
+            <a:r>
+              <a:rPr lang="en-US" dirty="0"/>
               <a:t>A member or an employee shall be able to request an invoice for a rental car payment.</a:t>
             </a:r>
-            <a:endParaRPr lang="en-US" dirty="0"/>
+            <a:endParaRPr lang="en-US" b="1" i="1" dirty="0"/>
           </a:p>
           <a:p>
             <a:pPr lvl="2"/>
@@ -11253,67 +11034,52 @@
             </a:r>
           </a:p>
           <a:p>
-            <a:pPr lvl="2" fontAlgn="base"/>
-            <a:r>
-              <a:rPr lang="en-US" sz="1200" dirty="0"/>
+            <a:pPr lvl="2"/>
+            <a:r>
+              <a:rPr lang="en-US" dirty="0"/>
               <a:t>A member shall be provided a pick-up location for their rental car via their chosen method of notification when the payment is approved.</a:t>
             </a:r>
-            <a:endParaRPr lang="en-US" dirty="0"/>
-          </a:p>
-          <a:p>
-            <a:pPr lvl="2" fontAlgn="base"/>
-            <a:r>
-              <a:rPr lang="en-US" sz="1200" dirty="0"/>
+            <a:endParaRPr lang="en-US" b="1" i="1" dirty="0"/>
+          </a:p>
+          <a:p>
+            <a:pPr lvl="2"/>
+            <a:r>
+              <a:rPr lang="en-US" dirty="0"/>
               <a:t>A member shall leave the rental car before the end of their rental end date at the rental end location.</a:t>
             </a:r>
-            <a:endParaRPr lang="en-US" dirty="0"/>
-          </a:p>
-          <a:p>
-            <a:pPr lvl="2" fontAlgn="base"/>
-            <a:r>
-              <a:rPr lang="en-US" sz="1200" dirty="0"/>
-              <a:t>An employee shall create a new incident report for a rental car before it is handed over to the customer.</a:t>
-            </a:r>
-            <a:endParaRPr lang="en-US" dirty="0"/>
-          </a:p>
-          <a:p>
-            <a:pPr lvl="2" fontAlgn="base"/>
-            <a:r>
-              <a:rPr lang="en-US" sz="1200" dirty="0"/>
+            <a:endParaRPr lang="en-US" b="1" i="1" dirty="0"/>
+          </a:p>
+          <a:p>
+            <a:pPr lvl="2"/>
+            <a:r>
+              <a:rPr lang="en-US" dirty="0"/>
+              <a:t>An employee shall create a new incident report for a rental car at the rental start date before it is handed over to the customer.</a:t>
+            </a:r>
+            <a:endParaRPr lang="en-US" b="1" i="1" dirty="0"/>
+          </a:p>
+          <a:p>
+            <a:pPr lvl="2"/>
+            <a:r>
+              <a:rPr lang="en-US" dirty="0"/>
               <a:t>An employee shall mark the delivery to the customer in the incident report.</a:t>
             </a:r>
-            <a:endParaRPr lang="en-US" dirty="0"/>
-          </a:p>
-          <a:p>
-            <a:pPr lvl="2" fontAlgn="base"/>
-            <a:r>
-              <a:rPr lang="en-US" sz="1200" dirty="0"/>
+            <a:endParaRPr lang="en-US" b="1" i="1" dirty="0"/>
+          </a:p>
+          <a:p>
+            <a:pPr lvl="2"/>
+            <a:r>
+              <a:rPr lang="en-US" dirty="0"/>
               <a:t>An employee shall mark it down in the incident report in the system when a rental car is returned by a member and when it was not returned in time.</a:t>
             </a:r>
-            <a:endParaRPr lang="en-US" dirty="0"/>
-          </a:p>
-          <a:p>
-            <a:pPr lvl="2" fontAlgn="base"/>
-            <a:r>
-              <a:rPr lang="en-US" sz="1200" dirty="0"/>
+            <a:endParaRPr lang="en-US" b="1" i="1" dirty="0"/>
+          </a:p>
+          <a:p>
+            <a:pPr lvl="2"/>
+            <a:r>
+              <a:rPr lang="en-US" dirty="0"/>
               <a:t>An employee shall enter the file number to the system which documents are stored related to the rent such as incident reports, signed documents by customer, etc.</a:t>
             </a:r>
-            <a:endParaRPr lang="en-US" dirty="0"/>
-          </a:p>
-          <a:p>
-            <a:pPr lvl="1"/>
-            <a:r>
-              <a:rPr lang="en-US" sz="1400" b="1" dirty="0"/>
-              <a:t>Promotion Requirements</a:t>
-            </a:r>
-          </a:p>
-          <a:p>
-            <a:pPr lvl="2" fontAlgn="base"/>
-            <a:r>
-              <a:rPr lang="en-US" sz="1200" dirty="0"/>
-              <a:t>In case of a promotion offer, a member shall opt for it on the website if they want to proceed with it.</a:t>
-            </a:r>
-            <a:endParaRPr lang="en-US" dirty="0"/>
+            <a:endParaRPr lang="en-US" b="1" i="1" dirty="0"/>
           </a:p>
           <a:p>
             <a:pPr lvl="2"/>

</xml_diff>